<commit_message>
Thêm đường dẫn github vào ppt
</commit_message>
<xml_diff>
--- a/Báo cáo QTDLiệu.pptx
+++ b/Báo cáo QTDLiệu.pptx
@@ -5,7 +5,7 @@
     <p:sldMasterId id="2147483681" r:id="rId1"/>
   </p:sldMasterIdLst>
   <p:notesMasterIdLst>
-    <p:notesMasterId r:id="rId33"/>
+    <p:notesMasterId r:id="rId34"/>
   </p:notesMasterIdLst>
   <p:sldIdLst>
     <p:sldId id="311" r:id="rId2"/>
@@ -38,63 +38,64 @@
     <p:sldId id="339" r:id="rId29"/>
     <p:sldId id="340" r:id="rId30"/>
     <p:sldId id="341" r:id="rId31"/>
-    <p:sldId id="290" r:id="rId32"/>
+    <p:sldId id="342" r:id="rId32"/>
+    <p:sldId id="290" r:id="rId33"/>
   </p:sldIdLst>
   <p:sldSz cx="9144000" cy="5143500" type="screen16x9"/>
   <p:notesSz cx="6858000" cy="9144000"/>
   <p:embeddedFontLst>
     <p:embeddedFont>
-      <p:font typeface="Calibri" panose="020F0502020204030204" pitchFamily="34" charset="0"/>
-      <p:regular r:id="rId34"/>
-      <p:bold r:id="rId35"/>
-      <p:italic r:id="rId36"/>
-      <p:boldItalic r:id="rId37"/>
+      <p:font typeface="Lato" panose="020B0604020202020204" charset="0"/>
+      <p:regular r:id="rId35"/>
+      <p:bold r:id="rId36"/>
+      <p:italic r:id="rId37"/>
+      <p:boldItalic r:id="rId38"/>
+    </p:embeddedFont>
+    <p:embeddedFont>
+      <p:font typeface="Merriweather Light" panose="020B0604020202020204" charset="0"/>
+      <p:regular r:id="rId39"/>
+      <p:bold r:id="rId40"/>
+      <p:italic r:id="rId41"/>
+      <p:boldItalic r:id="rId42"/>
+    </p:embeddedFont>
+    <p:embeddedFont>
+      <p:font typeface="Montserrat" panose="020B0604020202020204" charset="0"/>
+      <p:regular r:id="rId43"/>
+      <p:bold r:id="rId44"/>
+      <p:italic r:id="rId45"/>
+      <p:boldItalic r:id="rId46"/>
+    </p:embeddedFont>
+    <p:embeddedFont>
+      <p:font typeface="Open Sans" panose="020B0604020202020204" charset="0"/>
+      <p:regular r:id="rId47"/>
+      <p:bold r:id="rId48"/>
+      <p:italic r:id="rId49"/>
+      <p:boldItalic r:id="rId50"/>
     </p:embeddedFont>
     <p:embeddedFont>
       <p:font typeface="Crimson Text" panose="020B0604020202020204" charset="0"/>
-      <p:regular r:id="rId38"/>
-      <p:bold r:id="rId39"/>
-      <p:italic r:id="rId40"/>
-      <p:boldItalic r:id="rId41"/>
+      <p:regular r:id="rId51"/>
+      <p:bold r:id="rId52"/>
+      <p:italic r:id="rId53"/>
+      <p:boldItalic r:id="rId54"/>
     </p:embeddedFont>
     <p:embeddedFont>
-      <p:font typeface="Lato" panose="020B0604020202020204" charset="0"/>
-      <p:regular r:id="rId42"/>
-      <p:bold r:id="rId43"/>
-      <p:italic r:id="rId44"/>
-      <p:boldItalic r:id="rId45"/>
-    </p:embeddedFont>
-    <p:embeddedFont>
-      <p:font typeface="Montserrat" panose="020B0604020202020204" charset="0"/>
-      <p:regular r:id="rId46"/>
-      <p:bold r:id="rId47"/>
-      <p:italic r:id="rId48"/>
-      <p:boldItalic r:id="rId49"/>
-    </p:embeddedFont>
-    <p:embeddedFont>
-      <p:font typeface="Open Sans" panose="020B0604020202020204" charset="0"/>
-      <p:regular r:id="rId50"/>
-      <p:bold r:id="rId51"/>
-      <p:italic r:id="rId52"/>
-      <p:boldItalic r:id="rId53"/>
+      <p:font typeface="Calibri" panose="020F0502020204030204" pitchFamily="34" charset="0"/>
+      <p:regular r:id="rId55"/>
+      <p:bold r:id="rId56"/>
+      <p:italic r:id="rId57"/>
+      <p:boldItalic r:id="rId58"/>
     </p:embeddedFont>
     <p:embeddedFont>
       <p:font typeface="Cambria" panose="02040503050406030204" pitchFamily="18" charset="0"/>
-      <p:regular r:id="rId54"/>
-      <p:bold r:id="rId55"/>
-      <p:italic r:id="rId56"/>
-      <p:boldItalic r:id="rId57"/>
-    </p:embeddedFont>
-    <p:embeddedFont>
-      <p:font typeface="Vidaloka" panose="020B0604020202020204" charset="0"/>
-      <p:regular r:id="rId58"/>
-    </p:embeddedFont>
-    <p:embeddedFont>
-      <p:font typeface="Merriweather Light" panose="020B0604020202020204" charset="0"/>
       <p:regular r:id="rId59"/>
       <p:bold r:id="rId60"/>
       <p:italic r:id="rId61"/>
       <p:boldItalic r:id="rId62"/>
+    </p:embeddedFont>
+    <p:embeddedFont>
+      <p:font typeface="Vidaloka" panose="020B0604020202020204" charset="0"/>
+      <p:regular r:id="rId63"/>
     </p:embeddedFont>
   </p:embeddedFontLst>
   <p:defaultTextStyle>
@@ -5941,7 +5942,7 @@
                 <a:hlinkClick r:id="rId2">
                   <a:extLst>
                     <a:ext uri="{A12FA001-AC4F-418D-AE19-62706E023703}">
-                      <ahyp:hlinkClr xmlns="" xmlns:mc="http://schemas.openxmlformats.org/markup-compatibility/2006" xmlns:mv="urn:schemas-microsoft-com:mac:vml" xmlns:c="http://schemas.openxmlformats.org/drawingml/2006/chart" xmlns:dgm="http://schemas.openxmlformats.org/drawingml/2006/diagram" xmlns:o="urn:schemas-microsoft-com:office:office" xmlns:v="urn:schemas-microsoft-com:vml" xmlns:pvml="urn:schemas-microsoft-com:office:powerpoint" xmlns:com="http://schemas.openxmlformats.org/drawingml/2006/compatibility" xmlns:p14="http://schemas.microsoft.com/office/powerpoint/2010/main" xmlns:p15="http://schemas.microsoft.com/office/powerpoint/2012/main" xmlns:ahyp="http://schemas.microsoft.com/office/drawing/2018/hyperlinkcolor" val="tx"/>
+                      <ahyp:hlinkClr xmlns:ahyp="http://schemas.microsoft.com/office/drawing/2018/hyperlinkcolor" xmlns:p15="http://schemas.microsoft.com/office/powerpoint/2012/main" xmlns:p14="http://schemas.microsoft.com/office/powerpoint/2010/main" xmlns:com="http://schemas.openxmlformats.org/drawingml/2006/compatibility" xmlns:pvml="urn:schemas-microsoft-com:office:powerpoint" xmlns:v="urn:schemas-microsoft-com:vml" xmlns:o="urn:schemas-microsoft-com:office:office" xmlns:dgm="http://schemas.openxmlformats.org/drawingml/2006/diagram" xmlns:c="http://schemas.openxmlformats.org/drawingml/2006/chart" xmlns:mv="urn:schemas-microsoft-com:mac:vml" xmlns:mc="http://schemas.openxmlformats.org/markup-compatibility/2006" xmlns="" val="tx"/>
                     </a:ext>
                   </a:extLst>
                 </a:hlinkClick>
@@ -5975,7 +5976,7 @@
                 <a:hlinkClick r:id="rId3">
                   <a:extLst>
                     <a:ext uri="{A12FA001-AC4F-418D-AE19-62706E023703}">
-                      <ahyp:hlinkClr xmlns="" xmlns:mc="http://schemas.openxmlformats.org/markup-compatibility/2006" xmlns:mv="urn:schemas-microsoft-com:mac:vml" xmlns:c="http://schemas.openxmlformats.org/drawingml/2006/chart" xmlns:dgm="http://schemas.openxmlformats.org/drawingml/2006/diagram" xmlns:o="urn:schemas-microsoft-com:office:office" xmlns:v="urn:schemas-microsoft-com:vml" xmlns:pvml="urn:schemas-microsoft-com:office:powerpoint" xmlns:com="http://schemas.openxmlformats.org/drawingml/2006/compatibility" xmlns:p14="http://schemas.microsoft.com/office/powerpoint/2010/main" xmlns:p15="http://schemas.microsoft.com/office/powerpoint/2012/main" xmlns:ahyp="http://schemas.microsoft.com/office/drawing/2018/hyperlinkcolor" val="tx"/>
+                      <ahyp:hlinkClr xmlns:ahyp="http://schemas.microsoft.com/office/drawing/2018/hyperlinkcolor" xmlns:p15="http://schemas.microsoft.com/office/powerpoint/2012/main" xmlns:p14="http://schemas.microsoft.com/office/powerpoint/2010/main" xmlns:com="http://schemas.openxmlformats.org/drawingml/2006/compatibility" xmlns:pvml="urn:schemas-microsoft-com:office:powerpoint" xmlns:v="urn:schemas-microsoft-com:vml" xmlns:o="urn:schemas-microsoft-com:office:office" xmlns:dgm="http://schemas.openxmlformats.org/drawingml/2006/diagram" xmlns:c="http://schemas.openxmlformats.org/drawingml/2006/chart" xmlns:mv="urn:schemas-microsoft-com:mac:vml" xmlns:mc="http://schemas.openxmlformats.org/markup-compatibility/2006" xmlns="" val="tx"/>
                     </a:ext>
                   </a:extLst>
                 </a:hlinkClick>
@@ -6009,7 +6010,7 @@
                 <a:hlinkClick r:id="rId4">
                   <a:extLst>
                     <a:ext uri="{A12FA001-AC4F-418D-AE19-62706E023703}">
-                      <ahyp:hlinkClr xmlns="" xmlns:mc="http://schemas.openxmlformats.org/markup-compatibility/2006" xmlns:mv="urn:schemas-microsoft-com:mac:vml" xmlns:c="http://schemas.openxmlformats.org/drawingml/2006/chart" xmlns:dgm="http://schemas.openxmlformats.org/drawingml/2006/diagram" xmlns:o="urn:schemas-microsoft-com:office:office" xmlns:v="urn:schemas-microsoft-com:vml" xmlns:pvml="urn:schemas-microsoft-com:office:powerpoint" xmlns:com="http://schemas.openxmlformats.org/drawingml/2006/compatibility" xmlns:p14="http://schemas.microsoft.com/office/powerpoint/2010/main" xmlns:p15="http://schemas.microsoft.com/office/powerpoint/2012/main" xmlns:ahyp="http://schemas.microsoft.com/office/drawing/2018/hyperlinkcolor" val="tx"/>
+                      <ahyp:hlinkClr xmlns:ahyp="http://schemas.microsoft.com/office/drawing/2018/hyperlinkcolor" xmlns:p15="http://schemas.microsoft.com/office/powerpoint/2012/main" xmlns:p14="http://schemas.microsoft.com/office/powerpoint/2010/main" xmlns:com="http://schemas.openxmlformats.org/drawingml/2006/compatibility" xmlns:pvml="urn:schemas-microsoft-com:office:powerpoint" xmlns:v="urn:schemas-microsoft-com:vml" xmlns:o="urn:schemas-microsoft-com:office:office" xmlns:dgm="http://schemas.openxmlformats.org/drawingml/2006/diagram" xmlns:c="http://schemas.openxmlformats.org/drawingml/2006/chart" xmlns:mv="urn:schemas-microsoft-com:mac:vml" xmlns:mc="http://schemas.openxmlformats.org/markup-compatibility/2006" xmlns="" val="tx"/>
                     </a:ext>
                   </a:extLst>
                 </a:hlinkClick>
@@ -10009,6 +10010,142 @@
   <p:cSld>
     <p:spTree>
       <p:nvGrpSpPr>
+        <p:cNvPr id="1" name=""/>
+        <p:cNvGrpSpPr/>
+        <p:nvPr/>
+      </p:nvGrpSpPr>
+      <p:grpSpPr>
+        <a:xfrm>
+          <a:off x="0" y="0"/>
+          <a:ext cx="0" cy="0"/>
+          <a:chOff x="0" y="0"/>
+          <a:chExt cx="0" cy="0"/>
+        </a:xfrm>
+      </p:grpSpPr>
+      <p:sp>
+        <p:nvSpPr>
+          <p:cNvPr id="5" name="Google Shape;851;p72">
+            <a:extLst>
+              <a:ext uri="{FF2B5EF4-FFF2-40B4-BE49-F238E27FC236}">
+                <a16:creationId xmlns:a16="http://schemas.microsoft.com/office/drawing/2014/main" id="{ECA542F7-A837-44EF-98D5-65912355AEC7}"/>
+              </a:ext>
+            </a:extLst>
+          </p:cNvPr>
+          <p:cNvSpPr txBox="1">
+            <a:spLocks noGrp="1"/>
+          </p:cNvSpPr>
+          <p:nvPr>
+            <p:ph type="title"/>
+          </p:nvPr>
+        </p:nvSpPr>
+        <p:spPr>
+          <a:xfrm>
+            <a:off x="713225" y="445025"/>
+            <a:ext cx="7040590" cy="572700"/>
+          </a:xfrm>
+          <a:prstGeom prst="rect">
+            <a:avLst/>
+          </a:prstGeom>
+        </p:spPr>
+        <p:txBody>
+          <a:bodyPr spcFirstLastPara="1" wrap="square" lIns="91425" tIns="91425" rIns="91425" bIns="91425" anchor="t" anchorCtr="0">
+            <a:noAutofit/>
+          </a:bodyPr>
+          <a:lstStyle/>
+          <a:p>
+            <a:pPr marL="0" lvl="0" indent="0" algn="l" rtl="0">
+              <a:spcBef>
+                <a:spcPts val="0"/>
+              </a:spcBef>
+              <a:spcAft>
+                <a:spcPts val="0"/>
+              </a:spcAft>
+              <a:buNone/>
+            </a:pPr>
+            <a:r>
+              <a:rPr lang="en-US" b="1">
+                <a:latin typeface="Calibri" panose="020F0502020204030204" pitchFamily="34" charset="0"/>
+                <a:cs typeface="Calibri" panose="020F0502020204030204" pitchFamily="34" charset="0"/>
+              </a:rPr>
+              <a:t>Đ</a:t>
+            </a:r>
+            <a:r>
+              <a:rPr lang="vi-VN" b="1">
+                <a:latin typeface="Calibri" panose="020F0502020204030204" pitchFamily="34" charset="0"/>
+                <a:cs typeface="Calibri" panose="020F0502020204030204" pitchFamily="34" charset="0"/>
+              </a:rPr>
+              <a:t>ư</a:t>
+            </a:r>
+            <a:r>
+              <a:rPr lang="en-US" b="1">
+                <a:latin typeface="Calibri" panose="020F0502020204030204" pitchFamily="34" charset="0"/>
+                <a:cs typeface="Calibri" panose="020F0502020204030204" pitchFamily="34" charset="0"/>
+              </a:rPr>
+              <a:t>ờng dẫn Github đến Source Code đồ án</a:t>
+            </a:r>
+            <a:endParaRPr b="1">
+              <a:latin typeface="Calibri" panose="020F0502020204030204" pitchFamily="34" charset="0"/>
+              <a:cs typeface="Calibri" panose="020F0502020204030204" pitchFamily="34" charset="0"/>
+            </a:endParaRPr>
+          </a:p>
+        </p:txBody>
+      </p:sp>
+      <p:sp>
+        <p:nvSpPr>
+          <p:cNvPr id="6" name="TextBox 5">
+            <a:extLst>
+              <a:ext uri="{FF2B5EF4-FFF2-40B4-BE49-F238E27FC236}">
+                <a16:creationId xmlns:a16="http://schemas.microsoft.com/office/drawing/2014/main" id="{15EDBE34-EDCD-4567-A728-A3525FC5A70D}"/>
+              </a:ext>
+            </a:extLst>
+          </p:cNvPr>
+          <p:cNvSpPr txBox="1"/>
+          <p:nvPr/>
+        </p:nvSpPr>
+        <p:spPr>
+          <a:xfrm>
+            <a:off x="624242" y="1375317"/>
+            <a:ext cx="7218556" cy="307777"/>
+          </a:xfrm>
+          <a:prstGeom prst="rect">
+            <a:avLst/>
+          </a:prstGeom>
+          <a:noFill/>
+        </p:spPr>
+        <p:txBody>
+          <a:bodyPr wrap="square" rtlCol="0">
+            <a:spAutoFit/>
+          </a:bodyPr>
+          <a:lstStyle/>
+          <a:p>
+            <a:r>
+              <a:rPr lang="en-US">
+                <a:hlinkClick r:id="rId2"/>
+              </a:rPr>
+              <a:t>ngovinhhung2001/project.qtdlieu (github.com)</a:t>
+            </a:r>
+            <a:endParaRPr lang="en-US"/>
+          </a:p>
+        </p:txBody>
+      </p:sp>
+    </p:spTree>
+    <p:extLst>
+      <p:ext uri="{BB962C8B-B14F-4D97-AF65-F5344CB8AC3E}">
+        <p14:creationId xmlns:p14="http://schemas.microsoft.com/office/powerpoint/2010/main" val="946593488"/>
+      </p:ext>
+    </p:extLst>
+  </p:cSld>
+  <p:clrMapOvr>
+    <a:masterClrMapping/>
+  </p:clrMapOvr>
+</p:sld>
+</file>
+
+<file path=ppt/slides/slide32.xml><?xml version="1.0" encoding="utf-8"?>
+<p:sld xmlns:a="http://schemas.openxmlformats.org/drawingml/2006/main" xmlns:r="http://schemas.openxmlformats.org/officeDocument/2006/relationships" xmlns:p="http://schemas.openxmlformats.org/presentationml/2006/main">
+  <p:cSld>
+    <p:spTree>
+      <p:nvGrpSpPr>
         <p:cNvPr id="1" name="Shape 822"/>
         <p:cNvGrpSpPr/>
         <p:nvPr/>

</xml_diff>

<commit_message>
Commit lần cuối trước nộp bài
</commit_message>
<xml_diff>
--- a/Báo cáo QTDLiệu.pptx
+++ b/Báo cáo QTDLiệu.pptx
@@ -45,57 +45,57 @@
   <p:notesSz cx="6858000" cy="9144000"/>
   <p:embeddedFontLst>
     <p:embeddedFont>
+      <p:font typeface="Vidaloka" panose="020B0604020202020204" charset="0"/>
+      <p:regular r:id="rId35"/>
+    </p:embeddedFont>
+    <p:embeddedFont>
       <p:font typeface="Lato" panose="020B0604020202020204" charset="0"/>
-      <p:regular r:id="rId35"/>
-      <p:bold r:id="rId36"/>
-      <p:italic r:id="rId37"/>
-      <p:boldItalic r:id="rId38"/>
+      <p:regular r:id="rId36"/>
+      <p:bold r:id="rId37"/>
+      <p:italic r:id="rId38"/>
+      <p:boldItalic r:id="rId39"/>
+    </p:embeddedFont>
+    <p:embeddedFont>
+      <p:font typeface="Open Sans" panose="020B0604020202020204" charset="0"/>
+      <p:regular r:id="rId40"/>
+      <p:bold r:id="rId41"/>
+      <p:italic r:id="rId42"/>
+      <p:boldItalic r:id="rId43"/>
+    </p:embeddedFont>
+    <p:embeddedFont>
+      <p:font typeface="Montserrat" panose="020B0604020202020204" charset="0"/>
+      <p:regular r:id="rId44"/>
+      <p:bold r:id="rId45"/>
+      <p:italic r:id="rId46"/>
+      <p:boldItalic r:id="rId47"/>
+    </p:embeddedFont>
+    <p:embeddedFont>
+      <p:font typeface="Calibri" panose="020F0502020204030204" pitchFamily="34" charset="0"/>
+      <p:regular r:id="rId48"/>
+      <p:bold r:id="rId49"/>
+      <p:italic r:id="rId50"/>
+      <p:boldItalic r:id="rId51"/>
+    </p:embeddedFont>
+    <p:embeddedFont>
+      <p:font typeface="Cambria" panose="02040503050406030204" pitchFamily="18" charset="0"/>
+      <p:regular r:id="rId52"/>
+      <p:bold r:id="rId53"/>
+      <p:italic r:id="rId54"/>
+      <p:boldItalic r:id="rId55"/>
     </p:embeddedFont>
     <p:embeddedFont>
       <p:font typeface="Merriweather Light" panose="020B0604020202020204" charset="0"/>
-      <p:regular r:id="rId39"/>
-      <p:bold r:id="rId40"/>
-      <p:italic r:id="rId41"/>
-      <p:boldItalic r:id="rId42"/>
-    </p:embeddedFont>
-    <p:embeddedFont>
-      <p:font typeface="Montserrat" panose="020B0604020202020204" charset="0"/>
-      <p:regular r:id="rId43"/>
-      <p:bold r:id="rId44"/>
-      <p:italic r:id="rId45"/>
-      <p:boldItalic r:id="rId46"/>
-    </p:embeddedFont>
-    <p:embeddedFont>
-      <p:font typeface="Open Sans" panose="020B0604020202020204" charset="0"/>
-      <p:regular r:id="rId47"/>
-      <p:bold r:id="rId48"/>
-      <p:italic r:id="rId49"/>
-      <p:boldItalic r:id="rId50"/>
+      <p:regular r:id="rId56"/>
+      <p:bold r:id="rId57"/>
+      <p:italic r:id="rId58"/>
+      <p:boldItalic r:id="rId59"/>
     </p:embeddedFont>
     <p:embeddedFont>
       <p:font typeface="Crimson Text" panose="020B0604020202020204" charset="0"/>
-      <p:regular r:id="rId51"/>
-      <p:bold r:id="rId52"/>
-      <p:italic r:id="rId53"/>
-      <p:boldItalic r:id="rId54"/>
-    </p:embeddedFont>
-    <p:embeddedFont>
-      <p:font typeface="Calibri" panose="020F0502020204030204" pitchFamily="34" charset="0"/>
-      <p:regular r:id="rId55"/>
-      <p:bold r:id="rId56"/>
-      <p:italic r:id="rId57"/>
-      <p:boldItalic r:id="rId58"/>
-    </p:embeddedFont>
-    <p:embeddedFont>
-      <p:font typeface="Cambria" panose="02040503050406030204" pitchFamily="18" charset="0"/>
-      <p:regular r:id="rId59"/>
-      <p:bold r:id="rId60"/>
-      <p:italic r:id="rId61"/>
-      <p:boldItalic r:id="rId62"/>
-    </p:embeddedFont>
-    <p:embeddedFont>
-      <p:font typeface="Vidaloka" panose="020B0604020202020204" charset="0"/>
-      <p:regular r:id="rId63"/>
+      <p:regular r:id="rId60"/>
+      <p:bold r:id="rId61"/>
+      <p:italic r:id="rId62"/>
+      <p:boldItalic r:id="rId63"/>
     </p:embeddedFont>
   </p:embeddedFontLst>
   <p:defaultTextStyle>
@@ -5942,7 +5942,7 @@
                 <a:hlinkClick r:id="rId2">
                   <a:extLst>
                     <a:ext uri="{A12FA001-AC4F-418D-AE19-62706E023703}">
-                      <ahyp:hlinkClr xmlns:ahyp="http://schemas.microsoft.com/office/drawing/2018/hyperlinkcolor" xmlns:p15="http://schemas.microsoft.com/office/powerpoint/2012/main" xmlns:p14="http://schemas.microsoft.com/office/powerpoint/2010/main" xmlns:com="http://schemas.openxmlformats.org/drawingml/2006/compatibility" xmlns:pvml="urn:schemas-microsoft-com:office:powerpoint" xmlns:v="urn:schemas-microsoft-com:vml" xmlns:o="urn:schemas-microsoft-com:office:office" xmlns:dgm="http://schemas.openxmlformats.org/drawingml/2006/diagram" xmlns:c="http://schemas.openxmlformats.org/drawingml/2006/chart" xmlns:mv="urn:schemas-microsoft-com:mac:vml" xmlns:mc="http://schemas.openxmlformats.org/markup-compatibility/2006" xmlns="" val="tx"/>
+                      <ahyp:hlinkClr xmlns="" xmlns:mc="http://schemas.openxmlformats.org/markup-compatibility/2006" xmlns:mv="urn:schemas-microsoft-com:mac:vml" xmlns:c="http://schemas.openxmlformats.org/drawingml/2006/chart" xmlns:dgm="http://schemas.openxmlformats.org/drawingml/2006/diagram" xmlns:o="urn:schemas-microsoft-com:office:office" xmlns:v="urn:schemas-microsoft-com:vml" xmlns:pvml="urn:schemas-microsoft-com:office:powerpoint" xmlns:com="http://schemas.openxmlformats.org/drawingml/2006/compatibility" xmlns:p14="http://schemas.microsoft.com/office/powerpoint/2010/main" xmlns:p15="http://schemas.microsoft.com/office/powerpoint/2012/main" xmlns:ahyp="http://schemas.microsoft.com/office/drawing/2018/hyperlinkcolor" val="tx"/>
                     </a:ext>
                   </a:extLst>
                 </a:hlinkClick>
@@ -5976,7 +5976,7 @@
                 <a:hlinkClick r:id="rId3">
                   <a:extLst>
                     <a:ext uri="{A12FA001-AC4F-418D-AE19-62706E023703}">
-                      <ahyp:hlinkClr xmlns:ahyp="http://schemas.microsoft.com/office/drawing/2018/hyperlinkcolor" xmlns:p15="http://schemas.microsoft.com/office/powerpoint/2012/main" xmlns:p14="http://schemas.microsoft.com/office/powerpoint/2010/main" xmlns:com="http://schemas.openxmlformats.org/drawingml/2006/compatibility" xmlns:pvml="urn:schemas-microsoft-com:office:powerpoint" xmlns:v="urn:schemas-microsoft-com:vml" xmlns:o="urn:schemas-microsoft-com:office:office" xmlns:dgm="http://schemas.openxmlformats.org/drawingml/2006/diagram" xmlns:c="http://schemas.openxmlformats.org/drawingml/2006/chart" xmlns:mv="urn:schemas-microsoft-com:mac:vml" xmlns:mc="http://schemas.openxmlformats.org/markup-compatibility/2006" xmlns="" val="tx"/>
+                      <ahyp:hlinkClr xmlns="" xmlns:mc="http://schemas.openxmlformats.org/markup-compatibility/2006" xmlns:mv="urn:schemas-microsoft-com:mac:vml" xmlns:c="http://schemas.openxmlformats.org/drawingml/2006/chart" xmlns:dgm="http://schemas.openxmlformats.org/drawingml/2006/diagram" xmlns:o="urn:schemas-microsoft-com:office:office" xmlns:v="urn:schemas-microsoft-com:vml" xmlns:pvml="urn:schemas-microsoft-com:office:powerpoint" xmlns:com="http://schemas.openxmlformats.org/drawingml/2006/compatibility" xmlns:p14="http://schemas.microsoft.com/office/powerpoint/2010/main" xmlns:p15="http://schemas.microsoft.com/office/powerpoint/2012/main" xmlns:ahyp="http://schemas.microsoft.com/office/drawing/2018/hyperlinkcolor" val="tx"/>
                     </a:ext>
                   </a:extLst>
                 </a:hlinkClick>
@@ -6010,7 +6010,7 @@
                 <a:hlinkClick r:id="rId4">
                   <a:extLst>
                     <a:ext uri="{A12FA001-AC4F-418D-AE19-62706E023703}">
-                      <ahyp:hlinkClr xmlns:ahyp="http://schemas.microsoft.com/office/drawing/2018/hyperlinkcolor" xmlns:p15="http://schemas.microsoft.com/office/powerpoint/2012/main" xmlns:p14="http://schemas.microsoft.com/office/powerpoint/2010/main" xmlns:com="http://schemas.openxmlformats.org/drawingml/2006/compatibility" xmlns:pvml="urn:schemas-microsoft-com:office:powerpoint" xmlns:v="urn:schemas-microsoft-com:vml" xmlns:o="urn:schemas-microsoft-com:office:office" xmlns:dgm="http://schemas.openxmlformats.org/drawingml/2006/diagram" xmlns:c="http://schemas.openxmlformats.org/drawingml/2006/chart" xmlns:mv="urn:schemas-microsoft-com:mac:vml" xmlns:mc="http://schemas.openxmlformats.org/markup-compatibility/2006" xmlns="" val="tx"/>
+                      <ahyp:hlinkClr xmlns="" xmlns:mc="http://schemas.openxmlformats.org/markup-compatibility/2006" xmlns:mv="urn:schemas-microsoft-com:mac:vml" xmlns:c="http://schemas.openxmlformats.org/drawingml/2006/chart" xmlns:dgm="http://schemas.openxmlformats.org/drawingml/2006/diagram" xmlns:o="urn:schemas-microsoft-com:office:office" xmlns:v="urn:schemas-microsoft-com:vml" xmlns:pvml="urn:schemas-microsoft-com:office:powerpoint" xmlns:com="http://schemas.openxmlformats.org/drawingml/2006/compatibility" xmlns:p14="http://schemas.microsoft.com/office/powerpoint/2010/main" xmlns:p15="http://schemas.microsoft.com/office/powerpoint/2012/main" xmlns:ahyp="http://schemas.microsoft.com/office/drawing/2018/hyperlinkcolor" val="tx"/>
                     </a:ext>
                   </a:extLst>
                 </a:hlinkClick>
@@ -7522,7 +7522,7 @@
               <a:rPr lang="en-US">
                 <a:latin typeface="Montserrat" panose="020B0604020202020204" charset="0"/>
               </a:rPr>
-              <a:t>B1900000 Lê Hoàng Dũng</a:t>
+              <a:t>B1910201 Lê Hoàng Dũng</a:t>
             </a:r>
           </a:p>
         </p:txBody>

</xml_diff>